<commit_message>
Remade DKA and Table
</commit_message>
<xml_diff>
--- a/task5.pptx
+++ b/task5.pptx
@@ -19,6 +19,7 @@
     <p:sldId id="265" r:id="rId13"/>
     <p:sldId id="267" r:id="rId14"/>
     <p:sldId id="268" r:id="rId15"/>
+    <p:sldId id="271" r:id="rId16"/>
   </p:sldIdLst>
   <p:sldSz cx="12192000" cy="6858000"/>
   <p:notesSz cx="6858000" cy="9144000"/>
@@ -254,7 +255,7 @@
           <a:p>
             <a:fld id="{A32B6C15-7031-48CE-9B5C-080EB8C4C4AA}" type="datetimeFigureOut">
               <a:rPr lang="ru-RU" smtClean="0"/>
-              <a:t>08.12.2020</a:t>
+              <a:t>20.01.2021</a:t>
             </a:fld>
             <a:endParaRPr lang="ru-RU"/>
           </a:p>
@@ -422,7 +423,7 @@
           <a:p>
             <a:fld id="{A32B6C15-7031-48CE-9B5C-080EB8C4C4AA}" type="datetimeFigureOut">
               <a:rPr lang="ru-RU" smtClean="0"/>
-              <a:t>08.12.2020</a:t>
+              <a:t>20.01.2021</a:t>
             </a:fld>
             <a:endParaRPr lang="ru-RU"/>
           </a:p>
@@ -600,7 +601,7 @@
           <a:p>
             <a:fld id="{A32B6C15-7031-48CE-9B5C-080EB8C4C4AA}" type="datetimeFigureOut">
               <a:rPr lang="ru-RU" smtClean="0"/>
-              <a:t>08.12.2020</a:t>
+              <a:t>20.01.2021</a:t>
             </a:fld>
             <a:endParaRPr lang="ru-RU"/>
           </a:p>
@@ -768,7 +769,7 @@
           <a:p>
             <a:fld id="{A32B6C15-7031-48CE-9B5C-080EB8C4C4AA}" type="datetimeFigureOut">
               <a:rPr lang="ru-RU" smtClean="0"/>
-              <a:t>08.12.2020</a:t>
+              <a:t>20.01.2021</a:t>
             </a:fld>
             <a:endParaRPr lang="ru-RU"/>
           </a:p>
@@ -1013,7 +1014,7 @@
           <a:p>
             <a:fld id="{A32B6C15-7031-48CE-9B5C-080EB8C4C4AA}" type="datetimeFigureOut">
               <a:rPr lang="ru-RU" smtClean="0"/>
-              <a:t>08.12.2020</a:t>
+              <a:t>20.01.2021</a:t>
             </a:fld>
             <a:endParaRPr lang="ru-RU"/>
           </a:p>
@@ -1242,7 +1243,7 @@
           <a:p>
             <a:fld id="{A32B6C15-7031-48CE-9B5C-080EB8C4C4AA}" type="datetimeFigureOut">
               <a:rPr lang="ru-RU" smtClean="0"/>
-              <a:t>08.12.2020</a:t>
+              <a:t>20.01.2021</a:t>
             </a:fld>
             <a:endParaRPr lang="ru-RU"/>
           </a:p>
@@ -1606,7 +1607,7 @@
           <a:p>
             <a:fld id="{A32B6C15-7031-48CE-9B5C-080EB8C4C4AA}" type="datetimeFigureOut">
               <a:rPr lang="ru-RU" smtClean="0"/>
-              <a:t>08.12.2020</a:t>
+              <a:t>20.01.2021</a:t>
             </a:fld>
             <a:endParaRPr lang="ru-RU"/>
           </a:p>
@@ -1723,7 +1724,7 @@
           <a:p>
             <a:fld id="{A32B6C15-7031-48CE-9B5C-080EB8C4C4AA}" type="datetimeFigureOut">
               <a:rPr lang="ru-RU" smtClean="0"/>
-              <a:t>08.12.2020</a:t>
+              <a:t>20.01.2021</a:t>
             </a:fld>
             <a:endParaRPr lang="ru-RU"/>
           </a:p>
@@ -1818,7 +1819,7 @@
           <a:p>
             <a:fld id="{A32B6C15-7031-48CE-9B5C-080EB8C4C4AA}" type="datetimeFigureOut">
               <a:rPr lang="ru-RU" smtClean="0"/>
-              <a:t>08.12.2020</a:t>
+              <a:t>20.01.2021</a:t>
             </a:fld>
             <a:endParaRPr lang="ru-RU"/>
           </a:p>
@@ -2093,7 +2094,7 @@
           <a:p>
             <a:fld id="{A32B6C15-7031-48CE-9B5C-080EB8C4C4AA}" type="datetimeFigureOut">
               <a:rPr lang="ru-RU" smtClean="0"/>
-              <a:t>08.12.2020</a:t>
+              <a:t>20.01.2021</a:t>
             </a:fld>
             <a:endParaRPr lang="ru-RU"/>
           </a:p>
@@ -2345,7 +2346,7 @@
           <a:p>
             <a:fld id="{A32B6C15-7031-48CE-9B5C-080EB8C4C4AA}" type="datetimeFigureOut">
               <a:rPr lang="ru-RU" smtClean="0"/>
-              <a:t>08.12.2020</a:t>
+              <a:t>20.01.2021</a:t>
             </a:fld>
             <a:endParaRPr lang="ru-RU"/>
           </a:p>
@@ -2556,7 +2557,7 @@
           <a:p>
             <a:fld id="{A32B6C15-7031-48CE-9B5C-080EB8C4C4AA}" type="datetimeFigureOut">
               <a:rPr lang="ru-RU" smtClean="0"/>
-              <a:t>08.12.2020</a:t>
+              <a:t>20.01.2021</a:t>
             </a:fld>
             <a:endParaRPr lang="ru-RU"/>
           </a:p>
@@ -2980,7 +2981,7 @@
           </a:ln>
           <a:extLst>
             <a:ext uri="{C572A759-6A51-4108-AA02-DFA0A04FC94B}">
-              <ma14:wrappingTextBoxFlag xmlns:ma14="http://schemas.microsoft.com/office/mac/drawingml/2011/main" xmlns:a14="http://schemas.microsoft.com/office/drawing/2010/main" xmlns:m="http://schemas.openxmlformats.org/officeDocument/2006/math" xmlns="" val="1"/>
+              <ma14:wrappingTextBoxFlag xmlns="" xmlns:m="http://schemas.openxmlformats.org/officeDocument/2006/math" xmlns:a14="http://schemas.microsoft.com/office/drawing/2010/main" xmlns:ma14="http://schemas.microsoft.com/office/mac/drawingml/2011/main" val="1"/>
             </a:ext>
           </a:extLst>
         </p:spPr>
@@ -3299,7 +3300,7 @@
           </a:ln>
           <a:extLst>
             <a:ext uri="{C572A759-6A51-4108-AA02-DFA0A04FC94B}">
-              <ma14:wrappingTextBoxFlag xmlns:ma14="http://schemas.microsoft.com/office/mac/drawingml/2011/main" xmlns:a14="http://schemas.microsoft.com/office/drawing/2010/main" xmlns:m="http://schemas.openxmlformats.org/officeDocument/2006/math" xmlns="" val="1"/>
+              <ma14:wrappingTextBoxFlag xmlns="" xmlns:m="http://schemas.openxmlformats.org/officeDocument/2006/math" xmlns:a14="http://schemas.microsoft.com/office/drawing/2010/main" xmlns:ma14="http://schemas.microsoft.com/office/mac/drawingml/2011/main" val="1"/>
             </a:ext>
           </a:extLst>
         </p:spPr>
@@ -3738,6 +3739,10 @@
             <a:r>
               <a:rPr lang="en-US" sz="1400" dirty="0"/>
               <a:t>.</a:t>
+            </a:r>
+            <a:r>
+              <a:rPr lang="ru-RU" sz="1400" dirty="0"/>
+              <a:t/>
             </a:r>
             <a:br>
               <a:rPr lang="ru-RU" sz="1400" dirty="0"/>
@@ -4235,9 +4240,83 @@
           </a:p>
         </p:txBody>
       </p:sp>
+      <p:sp>
+        <p:nvSpPr>
+          <p:cNvPr id="12" name="TextBox 11"/>
+          <p:cNvSpPr txBox="1"/>
+          <p:nvPr/>
+        </p:nvSpPr>
+        <p:spPr>
+          <a:xfrm>
+            <a:off x="122879" y="649225"/>
+            <a:ext cx="1596193" cy="923330"/>
+          </a:xfrm>
+          <a:prstGeom prst="rect">
+            <a:avLst/>
+          </a:prstGeom>
+          <a:noFill/>
+        </p:spPr>
+        <p:txBody>
+          <a:bodyPr wrap="square" rtlCol="0">
+            <a:spAutoFit/>
+          </a:bodyPr>
+          <a:lstStyle/>
+          <a:p>
+            <a:r>
+              <a:rPr lang="ru-RU" dirty="0"/>
+              <a:t>А – начальное состояние</a:t>
+            </a:r>
+          </a:p>
+          <a:p>
+            <a:endParaRPr lang="ru-RU" dirty="0"/>
+          </a:p>
+        </p:txBody>
+      </p:sp>
+      <p:sp>
+        <p:nvSpPr>
+          <p:cNvPr id="3" name="TextBox 2">
+            <a:extLst>
+              <a:ext uri="{FF2B5EF4-FFF2-40B4-BE49-F238E27FC236}">
+                <a16:creationId xmlns:a16="http://schemas.microsoft.com/office/drawing/2014/main" id="{B07C0845-5FCA-48ED-9F98-2D931ADDBC30}"/>
+              </a:ext>
+            </a:extLst>
+          </p:cNvPr>
+          <p:cNvSpPr txBox="1"/>
+          <p:nvPr/>
+        </p:nvSpPr>
+        <p:spPr>
+          <a:xfrm>
+            <a:off x="6923313" y="5408675"/>
+            <a:ext cx="5145807" cy="1754326"/>
+          </a:xfrm>
+          <a:prstGeom prst="rect">
+            <a:avLst/>
+          </a:prstGeom>
+          <a:noFill/>
+        </p:spPr>
+        <p:txBody>
+          <a:bodyPr wrap="square" rtlCol="0">
+            <a:spAutoFit/>
+          </a:bodyPr>
+          <a:lstStyle/>
+          <a:p>
+            <a:r>
+              <a:rPr lang="ru-RU" dirty="0" smtClean="0"/>
+              <a:t>Полученный КА является детерминированным, так как А – начальное и единственное состояние и из каждого состояния есть </a:t>
+            </a:r>
+            <a:r>
+              <a:rPr lang="ru-RU" dirty="0"/>
+              <a:t>только один переход по одному символу, или такой переход отсутствует. </a:t>
+            </a:r>
+          </a:p>
+          <a:p>
+            <a:endParaRPr lang="ru-RU" dirty="0"/>
+          </a:p>
+        </p:txBody>
+      </p:sp>
       <p:pic>
         <p:nvPicPr>
-          <p:cNvPr id="9" name="Рисунок 8"/>
+          <p:cNvPr id="4" name="Рисунок 3"/>
           <p:cNvPicPr>
             <a:picLocks noChangeAspect="1"/>
           </p:cNvPicPr>
@@ -4251,8 +4330,8 @@
         </p:blipFill>
         <p:spPr>
           <a:xfrm>
-            <a:off x="6817973" y="649225"/>
-            <a:ext cx="5251148" cy="4911335"/>
+            <a:off x="505675" y="1229749"/>
+            <a:ext cx="6189419" cy="5654628"/>
           </a:xfrm>
           <a:prstGeom prst="rect">
             <a:avLst/>
@@ -4261,7 +4340,7 @@
       </p:pic>
       <p:pic>
         <p:nvPicPr>
-          <p:cNvPr id="11" name="Рисунок 10"/>
+          <p:cNvPr id="5" name="Рисунок 4"/>
           <p:cNvPicPr>
             <a:picLocks noChangeAspect="1"/>
           </p:cNvPicPr>
@@ -4275,89 +4354,14 @@
         </p:blipFill>
         <p:spPr>
           <a:xfrm>
-            <a:off x="0" y="751188"/>
-            <a:ext cx="6582668" cy="6106812"/>
+            <a:off x="6695094" y="782515"/>
+            <a:ext cx="5481136" cy="4492870"/>
           </a:xfrm>
           <a:prstGeom prst="rect">
             <a:avLst/>
           </a:prstGeom>
         </p:spPr>
       </p:pic>
-      <p:sp>
-        <p:nvSpPr>
-          <p:cNvPr id="12" name="TextBox 11"/>
-          <p:cNvSpPr txBox="1"/>
-          <p:nvPr/>
-        </p:nvSpPr>
-        <p:spPr>
-          <a:xfrm>
-            <a:off x="122879" y="649225"/>
-            <a:ext cx="1596193" cy="923330"/>
-          </a:xfrm>
-          <a:prstGeom prst="rect">
-            <a:avLst/>
-          </a:prstGeom>
-          <a:noFill/>
-        </p:spPr>
-        <p:txBody>
-          <a:bodyPr wrap="square" rtlCol="0">
-            <a:spAutoFit/>
-          </a:bodyPr>
-          <a:lstStyle/>
-          <a:p>
-            <a:r>
-              <a:rPr lang="ru-RU" dirty="0"/>
-              <a:t>А – начальное состояние</a:t>
-            </a:r>
-          </a:p>
-          <a:p>
-            <a:endParaRPr lang="ru-RU" dirty="0"/>
-          </a:p>
-        </p:txBody>
-      </p:sp>
-      <p:sp>
-        <p:nvSpPr>
-          <p:cNvPr id="3" name="TextBox 2">
-            <a:extLst>
-              <a:ext uri="{FF2B5EF4-FFF2-40B4-BE49-F238E27FC236}">
-                <a16:creationId xmlns:a16="http://schemas.microsoft.com/office/drawing/2014/main" id="{B07C0845-5FCA-48ED-9F98-2D931ADDBC30}"/>
-              </a:ext>
-            </a:extLst>
-          </p:cNvPr>
-          <p:cNvSpPr txBox="1"/>
-          <p:nvPr/>
-        </p:nvSpPr>
-        <p:spPr>
-          <a:xfrm>
-            <a:off x="6923313" y="5715000"/>
-            <a:ext cx="5145807" cy="923330"/>
-          </a:xfrm>
-          <a:prstGeom prst="rect">
-            <a:avLst/>
-          </a:prstGeom>
-          <a:noFill/>
-        </p:spPr>
-        <p:txBody>
-          <a:bodyPr wrap="square" rtlCol="0">
-            <a:spAutoFit/>
-          </a:bodyPr>
-          <a:lstStyle/>
-          <a:p>
-            <a:r>
-              <a:rPr lang="ru-RU" dirty="0"/>
-              <a:t>Полученный КА недетерминированный, т.к. из состояния </a:t>
-            </a:r>
-            <a:r>
-              <a:rPr lang="en-US" dirty="0"/>
-              <a:t>A </a:t>
-            </a:r>
-            <a:r>
-              <a:rPr lang="ru-RU" dirty="0"/>
-              <a:t>по символу + и – есть несколько переходов</a:t>
-            </a:r>
-          </a:p>
-        </p:txBody>
-      </p:sp>
     </p:spTree>
     <p:extLst>
       <p:ext uri="{BB962C8B-B14F-4D97-AF65-F5344CB8AC3E}">
@@ -4597,9 +4601,286 @@
           </a:p>
         </p:txBody>
       </p:sp>
+      <p:sp>
+        <p:nvSpPr>
+          <p:cNvPr id="5" name="TextBox 4"/>
+          <p:cNvSpPr txBox="1"/>
+          <p:nvPr/>
+        </p:nvSpPr>
+        <p:spPr>
+          <a:xfrm>
+            <a:off x="6719977" y="811059"/>
+            <a:ext cx="5472023" cy="6093976"/>
+          </a:xfrm>
+          <a:prstGeom prst="rect">
+            <a:avLst/>
+          </a:prstGeom>
+          <a:noFill/>
+        </p:spPr>
+        <p:txBody>
+          <a:bodyPr wrap="square" rtlCol="0">
+            <a:spAutoFit/>
+          </a:bodyPr>
+          <a:lstStyle/>
+          <a:p>
+            <a:pPr marL="342900" indent="-342900">
+              <a:buAutoNum type="arabicParenR"/>
+            </a:pPr>
+            <a:r>
+              <a:rPr lang="ru-RU" dirty="0"/>
+              <a:t>Цепочка: </a:t>
+            </a:r>
+            <a:r>
+              <a:rPr lang="ru-RU" dirty="0">
+                <a:solidFill>
+                  <a:srgbClr val="00B050"/>
+                </a:solidFill>
+              </a:rPr>
+              <a:t>3</a:t>
+            </a:r>
+            <a:r>
+              <a:rPr lang="ru-RU" dirty="0"/>
+              <a:t>1</a:t>
+            </a:r>
+            <a:r>
+              <a:rPr lang="ru-RU" sz="2800" dirty="0"/>
+              <a:t>.</a:t>
+            </a:r>
+            <a:r>
+              <a:rPr lang="ru-RU" dirty="0"/>
+              <a:t/>
+            </a:r>
+            <a:br>
+              <a:rPr lang="ru-RU" dirty="0"/>
+            </a:br>
+            <a:r>
+              <a:rPr lang="ru-RU" dirty="0"/>
+              <a:t>1. Начальное состояние А: Символ «3»  -</a:t>
+            </a:r>
+            <a:r>
+              <a:rPr lang="en-US" dirty="0"/>
+              <a:t>&gt; </a:t>
+            </a:r>
+            <a:r>
+              <a:rPr lang="ru-RU" dirty="0"/>
+              <a:t>переход в состояние </a:t>
+            </a:r>
+            <a:r>
+              <a:rPr lang="en-US" dirty="0"/>
+              <a:t>IP</a:t>
+            </a:r>
+            <a:endParaRPr lang="ru-RU" dirty="0"/>
+          </a:p>
+          <a:p>
+            <a:r>
+              <a:rPr lang="ru-RU" dirty="0"/>
+              <a:t>       Цепочка: 3</a:t>
+            </a:r>
+            <a:r>
+              <a:rPr lang="ru-RU" dirty="0">
+                <a:solidFill>
+                  <a:srgbClr val="00B050"/>
+                </a:solidFill>
+              </a:rPr>
+              <a:t>1</a:t>
+            </a:r>
+            <a:r>
+              <a:rPr lang="ru-RU" sz="2800" dirty="0"/>
+              <a:t>.</a:t>
+            </a:r>
+            <a:r>
+              <a:rPr lang="ru-RU" dirty="0"/>
+              <a:t/>
+            </a:r>
+            <a:br>
+              <a:rPr lang="ru-RU" dirty="0"/>
+            </a:br>
+            <a:r>
+              <a:rPr lang="ru-RU" dirty="0"/>
+              <a:t>       2. Состояние </a:t>
+            </a:r>
+            <a:r>
+              <a:rPr lang="en-US" dirty="0"/>
+              <a:t>IP: </a:t>
+            </a:r>
+            <a:r>
+              <a:rPr lang="ru-RU" dirty="0"/>
+              <a:t>Символ «1» </a:t>
+            </a:r>
+            <a:r>
+              <a:rPr lang="en-US" dirty="0"/>
+              <a:t>-&gt; </a:t>
+            </a:r>
+            <a:r>
+              <a:rPr lang="ru-RU" dirty="0"/>
+              <a:t>остаёмся в состоянии 1.</a:t>
+            </a:r>
+            <a:br>
+              <a:rPr lang="ru-RU" dirty="0"/>
+            </a:br>
+            <a:r>
+              <a:rPr lang="ru-RU" dirty="0"/>
+              <a:t>       Цепочка: 31</a:t>
+            </a:r>
+            <a:r>
+              <a:rPr lang="ru-RU" sz="2800" dirty="0">
+                <a:solidFill>
+                  <a:srgbClr val="00B050"/>
+                </a:solidFill>
+              </a:rPr>
+              <a:t>.</a:t>
+            </a:r>
+            <a:r>
+              <a:rPr lang="ru-RU" dirty="0"/>
+              <a:t/>
+            </a:r>
+            <a:br>
+              <a:rPr lang="ru-RU" dirty="0"/>
+            </a:br>
+            <a:r>
+              <a:rPr lang="ru-RU" dirty="0"/>
+              <a:t>       3. Состояние </a:t>
+            </a:r>
+            <a:r>
+              <a:rPr lang="en-US" dirty="0"/>
+              <a:t>IP: </a:t>
+            </a:r>
+            <a:r>
+              <a:rPr lang="ru-RU" dirty="0"/>
+              <a:t>Символ «.» –</a:t>
+            </a:r>
+            <a:r>
+              <a:rPr lang="en-US" dirty="0"/>
+              <a:t>&gt; </a:t>
+            </a:r>
+            <a:r>
+              <a:rPr lang="ru-RU" dirty="0"/>
+              <a:t>переход в состояние С</a:t>
+            </a:r>
+            <a:br>
+              <a:rPr lang="ru-RU" dirty="0"/>
+            </a:br>
+            <a:r>
+              <a:rPr lang="ru-RU" dirty="0"/>
+              <a:t>Цепочка кончилась, в конечное состояние не пришли – цепочка не распознана. Ошибка в состоянии С.</a:t>
+            </a:r>
+          </a:p>
+          <a:p>
+            <a:endParaRPr lang="ru-RU" dirty="0"/>
+          </a:p>
+          <a:p>
+            <a:pPr marL="342900" indent="-342900">
+              <a:buAutoNum type="arabicParenR"/>
+            </a:pPr>
+            <a:r>
+              <a:rPr lang="ru-RU" dirty="0"/>
+              <a:t>Цепочка </a:t>
+            </a:r>
+            <a:r>
+              <a:rPr lang="en-US" dirty="0">
+                <a:solidFill>
+                  <a:srgbClr val="00B050"/>
+                </a:solidFill>
+              </a:rPr>
+              <a:t>A</a:t>
+            </a:r>
+            <a:r>
+              <a:rPr lang="en-US" dirty="0"/>
+              <a:t>1</a:t>
+            </a:r>
+            <a:endParaRPr lang="ru-RU" dirty="0"/>
+          </a:p>
+          <a:p>
+            <a:r>
+              <a:rPr lang="ru-RU" dirty="0"/>
+              <a:t>       1. Начальное состояние А: Символ «</a:t>
+            </a:r>
+            <a:r>
+              <a:rPr lang="en-US" dirty="0"/>
+              <a:t>A</a:t>
+            </a:r>
+            <a:r>
+              <a:rPr lang="ru-RU" dirty="0"/>
+              <a:t>»  -</a:t>
+            </a:r>
+            <a:r>
+              <a:rPr lang="en-US" dirty="0"/>
+              <a:t>&gt; </a:t>
+            </a:r>
+            <a:r>
+              <a:rPr lang="ru-RU" dirty="0"/>
+              <a:t>переход в состояние </a:t>
+            </a:r>
+            <a:r>
+              <a:rPr lang="en-US" dirty="0"/>
+              <a:t>B</a:t>
+            </a:r>
+            <a:r>
+              <a:rPr lang="ru-RU" dirty="0"/>
+              <a:t/>
+            </a:r>
+            <a:br>
+              <a:rPr lang="ru-RU" dirty="0"/>
+            </a:br>
+            <a:r>
+              <a:rPr lang="ru-RU" dirty="0"/>
+              <a:t>        Цепочка </a:t>
+            </a:r>
+            <a:r>
+              <a:rPr lang="en-US" dirty="0"/>
+              <a:t>A</a:t>
+            </a:r>
+            <a:r>
+              <a:rPr lang="ru-RU" dirty="0">
+                <a:solidFill>
+                  <a:srgbClr val="00B050"/>
+                </a:solidFill>
+              </a:rPr>
+              <a:t>1</a:t>
+            </a:r>
+          </a:p>
+          <a:p>
+            <a:r>
+              <a:rPr lang="ru-RU" dirty="0"/>
+              <a:t>       2. Состояние </a:t>
+            </a:r>
+            <a:r>
+              <a:rPr lang="en-US" dirty="0"/>
+              <a:t>B: </a:t>
+            </a:r>
+            <a:r>
+              <a:rPr lang="ru-RU" dirty="0"/>
+              <a:t>Символ «</a:t>
+            </a:r>
+            <a:r>
+              <a:rPr lang="en-US" dirty="0"/>
+              <a:t>1</a:t>
+            </a:r>
+            <a:r>
+              <a:rPr lang="ru-RU" dirty="0"/>
+              <a:t>» –</a:t>
+            </a:r>
+            <a:r>
+              <a:rPr lang="en-US" dirty="0"/>
+              <a:t>&gt; </a:t>
+            </a:r>
+            <a:r>
+              <a:rPr lang="ru-RU" dirty="0"/>
+              <a:t>остаёмся в состоянии С</a:t>
+            </a:r>
+            <a:br>
+              <a:rPr lang="ru-RU" dirty="0"/>
+            </a:br>
+            <a:r>
+              <a:rPr lang="ru-RU" dirty="0"/>
+              <a:t>Пришли в конечное состояние С, цепочка распознана как идентификатор переменной.</a:t>
+            </a:r>
+          </a:p>
+        </p:txBody>
+      </p:sp>
       <p:pic>
         <p:nvPicPr>
-          <p:cNvPr id="4" name="Рисунок 3"/>
+          <p:cNvPr id="6" name="Рисунок 5"/>
           <p:cNvPicPr>
             <a:picLocks noChangeAspect="1"/>
           </p:cNvPicPr>
@@ -4613,279 +4894,94 @@
         </p:blipFill>
         <p:spPr>
           <a:xfrm>
-            <a:off x="0" y="811059"/>
-            <a:ext cx="6492325" cy="6046941"/>
+            <a:off x="132640" y="811059"/>
+            <a:ext cx="6454698" cy="5896986"/>
           </a:xfrm>
           <a:prstGeom prst="rect">
             <a:avLst/>
           </a:prstGeom>
         </p:spPr>
       </p:pic>
-      <p:sp>
-        <p:nvSpPr>
-          <p:cNvPr id="5" name="TextBox 4"/>
-          <p:cNvSpPr txBox="1"/>
-          <p:nvPr/>
-        </p:nvSpPr>
-        <p:spPr>
-          <a:xfrm>
-            <a:off x="6719977" y="811059"/>
-            <a:ext cx="5472023" cy="6093976"/>
-          </a:xfrm>
-          <a:prstGeom prst="rect">
-            <a:avLst/>
-          </a:prstGeom>
-          <a:noFill/>
-        </p:spPr>
-        <p:txBody>
-          <a:bodyPr wrap="square" rtlCol="0">
-            <a:spAutoFit/>
-          </a:bodyPr>
-          <a:lstStyle/>
-          <a:p>
-            <a:pPr marL="342900" indent="-342900">
-              <a:buAutoNum type="arabicParenR"/>
-            </a:pPr>
-            <a:r>
-              <a:rPr lang="ru-RU" dirty="0"/>
-              <a:t>Цепочка: </a:t>
-            </a:r>
-            <a:r>
-              <a:rPr lang="ru-RU" dirty="0">
-                <a:solidFill>
-                  <a:srgbClr val="00B050"/>
-                </a:solidFill>
-              </a:rPr>
-              <a:t>3</a:t>
-            </a:r>
-            <a:r>
-              <a:rPr lang="ru-RU" dirty="0"/>
-              <a:t>1</a:t>
-            </a:r>
-            <a:r>
-              <a:rPr lang="ru-RU" sz="2800" dirty="0"/>
-              <a:t>.</a:t>
-            </a:r>
-            <a:br>
-              <a:rPr lang="ru-RU" dirty="0"/>
-            </a:br>
-            <a:r>
-              <a:rPr lang="ru-RU" dirty="0"/>
-              <a:t>1. Начальное состояние А: Символ «3»  -</a:t>
-            </a:r>
-            <a:r>
-              <a:rPr lang="en-US" dirty="0"/>
-              <a:t>&gt; </a:t>
-            </a:r>
-            <a:r>
-              <a:rPr lang="ru-RU" dirty="0"/>
-              <a:t>переход в состояние </a:t>
-            </a:r>
-            <a:r>
-              <a:rPr lang="en-US" dirty="0"/>
-              <a:t>IP</a:t>
-            </a:r>
-            <a:endParaRPr lang="ru-RU" dirty="0"/>
-          </a:p>
-          <a:p>
-            <a:r>
-              <a:rPr lang="ru-RU" dirty="0"/>
-              <a:t>       Цепочка: 3</a:t>
-            </a:r>
-            <a:r>
-              <a:rPr lang="ru-RU" dirty="0">
-                <a:solidFill>
-                  <a:srgbClr val="00B050"/>
-                </a:solidFill>
-              </a:rPr>
-              <a:t>1</a:t>
-            </a:r>
-            <a:r>
-              <a:rPr lang="ru-RU" sz="2800" dirty="0"/>
-              <a:t>.</a:t>
-            </a:r>
-            <a:br>
-              <a:rPr lang="ru-RU" dirty="0"/>
-            </a:br>
-            <a:r>
-              <a:rPr lang="ru-RU" dirty="0"/>
-              <a:t>       2. Состояние </a:t>
-            </a:r>
-            <a:r>
-              <a:rPr lang="en-US" dirty="0"/>
-              <a:t>IP: </a:t>
-            </a:r>
-            <a:r>
-              <a:rPr lang="ru-RU" dirty="0"/>
-              <a:t>Символ «1» </a:t>
-            </a:r>
-            <a:r>
-              <a:rPr lang="en-US" dirty="0"/>
-              <a:t>-&gt; </a:t>
-            </a:r>
-            <a:r>
-              <a:rPr lang="ru-RU" dirty="0"/>
-              <a:t>остаёмся в состоянии 1.</a:t>
-            </a:r>
-            <a:br>
-              <a:rPr lang="ru-RU" dirty="0"/>
-            </a:br>
-            <a:r>
-              <a:rPr lang="ru-RU" dirty="0"/>
-              <a:t>       Цепочка: 31</a:t>
-            </a:r>
-            <a:r>
-              <a:rPr lang="ru-RU" sz="2800" dirty="0">
-                <a:solidFill>
-                  <a:srgbClr val="00B050"/>
-                </a:solidFill>
-              </a:rPr>
-              <a:t>.</a:t>
-            </a:r>
-            <a:br>
-              <a:rPr lang="ru-RU" dirty="0"/>
-            </a:br>
-            <a:r>
-              <a:rPr lang="ru-RU" dirty="0"/>
-              <a:t>       3. Состояние </a:t>
-            </a:r>
-            <a:r>
-              <a:rPr lang="en-US" dirty="0"/>
-              <a:t>IP: </a:t>
-            </a:r>
-            <a:r>
-              <a:rPr lang="ru-RU" dirty="0"/>
-              <a:t>Символ «.» –</a:t>
-            </a:r>
-            <a:r>
-              <a:rPr lang="en-US" dirty="0"/>
-              <a:t>&gt; </a:t>
-            </a:r>
-            <a:r>
-              <a:rPr lang="ru-RU" dirty="0"/>
-              <a:t>переход в состояние С</a:t>
-            </a:r>
-            <a:br>
-              <a:rPr lang="ru-RU" dirty="0"/>
-            </a:br>
-            <a:r>
-              <a:rPr lang="ru-RU" dirty="0"/>
-              <a:t>Цепочка кончилась, в конечное состояние не пришли – цепочка не распознана. Ошибка в состоянии С.</a:t>
-            </a:r>
-          </a:p>
-          <a:p>
-            <a:endParaRPr lang="ru-RU" dirty="0"/>
-          </a:p>
-          <a:p>
-            <a:pPr marL="342900" indent="-342900">
-              <a:buAutoNum type="arabicParenR"/>
-            </a:pPr>
-            <a:r>
-              <a:rPr lang="ru-RU" dirty="0"/>
-              <a:t>Цепочка </a:t>
-            </a:r>
-            <a:r>
-              <a:rPr lang="en-US" dirty="0">
-                <a:solidFill>
-                  <a:srgbClr val="00B050"/>
-                </a:solidFill>
-              </a:rPr>
-              <a:t>A</a:t>
-            </a:r>
-            <a:r>
-              <a:rPr lang="en-US" dirty="0"/>
-              <a:t>1</a:t>
-            </a:r>
-            <a:endParaRPr lang="ru-RU" dirty="0"/>
-          </a:p>
-          <a:p>
-            <a:r>
-              <a:rPr lang="ru-RU" dirty="0"/>
-              <a:t>       1. Начальное состояние А: Символ «</a:t>
-            </a:r>
-            <a:r>
-              <a:rPr lang="en-US" dirty="0"/>
-              <a:t>A</a:t>
-            </a:r>
-            <a:r>
-              <a:rPr lang="ru-RU" dirty="0"/>
-              <a:t>»  -</a:t>
-            </a:r>
-            <a:r>
-              <a:rPr lang="en-US" dirty="0"/>
-              <a:t>&gt; </a:t>
-            </a:r>
-            <a:r>
-              <a:rPr lang="ru-RU" dirty="0"/>
-              <a:t>переход в состояние </a:t>
-            </a:r>
-            <a:r>
-              <a:rPr lang="en-US" dirty="0"/>
-              <a:t>B</a:t>
-            </a:r>
-            <a:br>
-              <a:rPr lang="ru-RU" dirty="0"/>
-            </a:br>
-            <a:r>
-              <a:rPr lang="ru-RU" dirty="0"/>
-              <a:t>        Цепочка </a:t>
-            </a:r>
-            <a:r>
-              <a:rPr lang="en-US" dirty="0"/>
-              <a:t>A</a:t>
-            </a:r>
-            <a:r>
-              <a:rPr lang="ru-RU" dirty="0">
-                <a:solidFill>
-                  <a:srgbClr val="00B050"/>
-                </a:solidFill>
-              </a:rPr>
-              <a:t>1</a:t>
-            </a:r>
-          </a:p>
-          <a:p>
-            <a:r>
-              <a:rPr lang="ru-RU" dirty="0"/>
-              <a:t>       2. Состояние </a:t>
-            </a:r>
-            <a:r>
-              <a:rPr lang="en-US" dirty="0"/>
-              <a:t>B: </a:t>
-            </a:r>
-            <a:r>
-              <a:rPr lang="ru-RU" dirty="0"/>
-              <a:t>Символ «</a:t>
-            </a:r>
-            <a:r>
-              <a:rPr lang="en-US" dirty="0"/>
-              <a:t>1</a:t>
-            </a:r>
-            <a:r>
-              <a:rPr lang="ru-RU" dirty="0"/>
-              <a:t>» –</a:t>
-            </a:r>
-            <a:r>
-              <a:rPr lang="en-US" dirty="0"/>
-              <a:t>&gt; </a:t>
-            </a:r>
-            <a:r>
-              <a:rPr lang="ru-RU" dirty="0"/>
-              <a:t>остаёмся в состоянии С</a:t>
-            </a:r>
-            <a:br>
-              <a:rPr lang="ru-RU" dirty="0"/>
-            </a:br>
-            <a:r>
-              <a:rPr lang="ru-RU" dirty="0"/>
-              <a:t>Пришли в конечное состояние С, цепочка распознана как идентификатор переменной.</a:t>
-            </a:r>
-          </a:p>
-        </p:txBody>
-      </p:sp>
     </p:spTree>
     <p:extLst>
       <p:ext uri="{BB962C8B-B14F-4D97-AF65-F5344CB8AC3E}">
         <p14:creationId xmlns:p14="http://schemas.microsoft.com/office/powerpoint/2010/main" val="1598212069"/>
+      </p:ext>
+    </p:extLst>
+  </p:cSld>
+  <p:clrMapOvr>
+    <a:masterClrMapping/>
+  </p:clrMapOvr>
+</p:sld>
+</file>
+
+<file path=ppt/slides/slide15.xml><?xml version="1.0" encoding="utf-8"?>
+<p:sld xmlns:a="http://schemas.openxmlformats.org/drawingml/2006/main" xmlns:r="http://schemas.openxmlformats.org/officeDocument/2006/relationships" xmlns:p="http://schemas.openxmlformats.org/presentationml/2006/main">
+  <p:cSld>
+    <p:spTree>
+      <p:nvGrpSpPr>
+        <p:cNvPr id="1" name=""/>
+        <p:cNvGrpSpPr/>
+        <p:nvPr/>
+      </p:nvGrpSpPr>
+      <p:grpSpPr>
+        <a:xfrm>
+          <a:off x="0" y="0"/>
+          <a:ext cx="0" cy="0"/>
+          <a:chOff x="0" y="0"/>
+          <a:chExt cx="0" cy="0"/>
+        </a:xfrm>
+      </p:grpSpPr>
+      <p:sp>
+        <p:nvSpPr>
+          <p:cNvPr id="2" name="Заголовок 1"/>
+          <p:cNvSpPr>
+            <a:spLocks noGrp="1"/>
+          </p:cNvSpPr>
+          <p:nvPr>
+            <p:ph type="title"/>
+          </p:nvPr>
+        </p:nvSpPr>
+        <p:spPr/>
+        <p:txBody>
+          <a:bodyPr/>
+          <a:lstStyle/>
+          <a:p>
+            <a:r>
+              <a:rPr lang="ru-RU" dirty="0" smtClean="0"/>
+              <a:t>Лексические ошибки – </a:t>
+            </a:r>
+            <a:r>
+              <a:rPr lang="ru-RU" smtClean="0"/>
+              <a:t>хз</a:t>
+            </a:r>
+            <a:endParaRPr lang="ru-RU"/>
+          </a:p>
+        </p:txBody>
+      </p:sp>
+      <p:sp>
+        <p:nvSpPr>
+          <p:cNvPr id="3" name="Объект 2"/>
+          <p:cNvSpPr>
+            <a:spLocks noGrp="1"/>
+          </p:cNvSpPr>
+          <p:nvPr>
+            <p:ph idx="1"/>
+          </p:nvPr>
+        </p:nvSpPr>
+        <p:spPr/>
+        <p:txBody>
+          <a:bodyPr/>
+          <a:lstStyle/>
+          <a:p>
+            <a:endParaRPr lang="ru-RU"/>
+          </a:p>
+        </p:txBody>
+      </p:sp>
+    </p:spTree>
+    <p:extLst>
+      <p:ext uri="{BB962C8B-B14F-4D97-AF65-F5344CB8AC3E}">
+        <p14:creationId xmlns:p14="http://schemas.microsoft.com/office/powerpoint/2010/main" val="1153953158"/>
       </p:ext>
     </p:extLst>
   </p:cSld>
@@ -5146,6 +5242,10 @@
               <a:rPr lang="en-US" sz="2000" dirty="0"/>
               <a:t>, A2, A3)</a:t>
             </a:r>
+            <a:r>
+              <a:rPr lang="ru-RU" sz="2000" dirty="0"/>
+              <a:t/>
+            </a:r>
             <a:br>
               <a:rPr lang="ru-RU" sz="2000" dirty="0"/>
             </a:br>
@@ -5156,6 +5256,10 @@
             <a:r>
               <a:rPr lang="en-US" sz="2000" dirty="0"/>
               <a:t> (1, 2)</a:t>
+            </a:r>
+            <a:r>
+              <a:rPr lang="ru-RU" sz="2000" dirty="0"/>
+              <a:t/>
             </a:r>
             <a:br>
               <a:rPr lang="ru-RU" sz="2000" dirty="0"/>
@@ -6226,6 +6330,10 @@
                   <a:rPr lang="en-US" sz="2000" dirty="0"/>
                   <a:t>e = +</a:t>
                 </a:r>
+                <a:r>
+                  <a:rPr lang="ru-RU" sz="2000" dirty="0"/>
+                  <a:t/>
+                </a:r>
                 <a:br>
                   <a:rPr lang="ru-RU" sz="2000" dirty="0"/>
                 </a:br>
@@ -6243,6 +6351,10 @@
                   <a:rPr lang="en-US" sz="2000" dirty="0"/>
                   <a:t>	e = *</a:t>
                 </a:r>
+                <a:r>
+                  <a:rPr lang="ru-RU" sz="2000" dirty="0"/>
+                  <a:t/>
+                </a:r>
                 <a:br>
                   <a:rPr lang="ru-RU" sz="2000" dirty="0"/>
                 </a:br>
@@ -6259,6 +6371,10 @@
                 <a:r>
                   <a:rPr lang="en-US" sz="2000" dirty="0"/>
                   <a:t>	e = /</a:t>
+                </a:r>
+                <a:r>
+                  <a:rPr lang="ru-RU" sz="2000" dirty="0"/>
+                  <a:t/>
                 </a:r>
                 <a:br>
                   <a:rPr lang="ru-RU" sz="2000" dirty="0"/>

</xml_diff>